<commit_message>
Informe FInal y presentacion
</commit_message>
<xml_diff>
--- a/Docs/3.4Evaluación de resultados.pptx
+++ b/Docs/3.4Evaluación de resultados.pptx
@@ -106,6 +106,11 @@
       </a:defRPr>
     </a:lvl9pPr>
   </p:defaultTextStyle>
+  <p:extLst>
+    <p:ext uri="{EFAFB233-063F-42B5-8137-9DF3F51BA10A}">
+      <p15:sldGuideLst xmlns:p15="http://schemas.microsoft.com/office/powerpoint/2012/main"/>
+    </p:ext>
+  </p:extLst>
 </p:presentation>
 </file>
 
@@ -335,7 +340,7 @@
           <a:p>
             <a:fld id="{78BDB4D9-4BD4-474B-AD71-B86B2305AA5C}" type="datetimeFigureOut">
               <a:rPr lang="es-PE" smtClean="0"/>
-              <a:t>3/07/2022</a:t>
+              <a:t>04/07/2022</a:t>
             </a:fld>
             <a:endParaRPr lang="es-PE"/>
           </a:p>
@@ -543,7 +548,7 @@
           <a:p>
             <a:fld id="{78BDB4D9-4BD4-474B-AD71-B86B2305AA5C}" type="datetimeFigureOut">
               <a:rPr lang="es-PE" smtClean="0"/>
-              <a:t>3/07/2022</a:t>
+              <a:t>04/07/2022</a:t>
             </a:fld>
             <a:endParaRPr lang="es-PE"/>
           </a:p>
@@ -799,7 +804,7 @@
           <a:p>
             <a:fld id="{78BDB4D9-4BD4-474B-AD71-B86B2305AA5C}" type="datetimeFigureOut">
               <a:rPr lang="es-PE" smtClean="0"/>
-              <a:t>3/07/2022</a:t>
+              <a:t>04/07/2022</a:t>
             </a:fld>
             <a:endParaRPr lang="es-PE"/>
           </a:p>
@@ -973,7 +978,7 @@
           <a:p>
             <a:fld id="{78BDB4D9-4BD4-474B-AD71-B86B2305AA5C}" type="datetimeFigureOut">
               <a:rPr lang="es-PE" smtClean="0"/>
-              <a:t>3/07/2022</a:t>
+              <a:t>04/07/2022</a:t>
             </a:fld>
             <a:endParaRPr lang="es-PE"/>
           </a:p>
@@ -1316,7 +1321,7 @@
           <a:p>
             <a:fld id="{78BDB4D9-4BD4-474B-AD71-B86B2305AA5C}" type="datetimeFigureOut">
               <a:rPr lang="es-PE" smtClean="0"/>
-              <a:t>3/07/2022</a:t>
+              <a:t>04/07/2022</a:t>
             </a:fld>
             <a:endParaRPr lang="es-PE"/>
           </a:p>
@@ -1591,7 +1596,7 @@
           <a:p>
             <a:fld id="{78BDB4D9-4BD4-474B-AD71-B86B2305AA5C}" type="datetimeFigureOut">
               <a:rPr lang="es-PE" smtClean="0"/>
-              <a:t>3/07/2022</a:t>
+              <a:t>04/07/2022</a:t>
             </a:fld>
             <a:endParaRPr lang="es-PE"/>
           </a:p>
@@ -1970,7 +1975,7 @@
           <a:p>
             <a:fld id="{78BDB4D9-4BD4-474B-AD71-B86B2305AA5C}" type="datetimeFigureOut">
               <a:rPr lang="es-PE" smtClean="0"/>
-              <a:t>3/07/2022</a:t>
+              <a:t>04/07/2022</a:t>
             </a:fld>
             <a:endParaRPr lang="es-PE"/>
           </a:p>
@@ -2088,7 +2093,7 @@
           <a:p>
             <a:fld id="{78BDB4D9-4BD4-474B-AD71-B86B2305AA5C}" type="datetimeFigureOut">
               <a:rPr lang="es-PE" smtClean="0"/>
-              <a:t>3/07/2022</a:t>
+              <a:t>04/07/2022</a:t>
             </a:fld>
             <a:endParaRPr lang="es-PE"/>
           </a:p>
@@ -2259,7 +2264,7 @@
           <a:p>
             <a:fld id="{78BDB4D9-4BD4-474B-AD71-B86B2305AA5C}" type="datetimeFigureOut">
               <a:rPr lang="es-PE" smtClean="0"/>
-              <a:t>3/07/2022</a:t>
+              <a:t>04/07/2022</a:t>
             </a:fld>
             <a:endParaRPr lang="es-PE"/>
           </a:p>
@@ -2613,7 +2618,7 @@
           <a:p>
             <a:fld id="{78BDB4D9-4BD4-474B-AD71-B86B2305AA5C}" type="datetimeFigureOut">
               <a:rPr lang="es-PE" smtClean="0"/>
-              <a:t>3/07/2022</a:t>
+              <a:t>04/07/2022</a:t>
             </a:fld>
             <a:endParaRPr lang="es-PE"/>
           </a:p>
@@ -2995,7 +3000,7 @@
           <a:p>
             <a:fld id="{78BDB4D9-4BD4-474B-AD71-B86B2305AA5C}" type="datetimeFigureOut">
               <a:rPr lang="es-PE" smtClean="0"/>
-              <a:t>3/07/2022</a:t>
+              <a:t>04/07/2022</a:t>
             </a:fld>
             <a:endParaRPr lang="es-PE"/>
           </a:p>
@@ -3282,7 +3287,7 @@
           <a:p>
             <a:fld id="{78BDB4D9-4BD4-474B-AD71-B86B2305AA5C}" type="datetimeFigureOut">
               <a:rPr lang="es-PE" smtClean="0"/>
-              <a:t>3/07/2022</a:t>
+              <a:t>04/07/2022</a:t>
             </a:fld>
             <a:endParaRPr lang="es-PE"/>
           </a:p>
@@ -3911,6 +3916,11 @@
           </p:cNvGraphicFramePr>
           <p:nvPr>
             <p:ph idx="1"/>
+            <p:extLst>
+              <p:ext uri="{D42A27DB-BD31-4B8C-83A1-F6EECF244321}">
+                <p14:modId xmlns:p14="http://schemas.microsoft.com/office/powerpoint/2010/main" val="78628938"/>
+              </p:ext>
+            </p:extLst>
           </p:nvPr>
         </p:nvGraphicFramePr>
         <p:xfrm>
@@ -4286,7 +4296,7 @@
                       <a:pPr algn="ctr"/>
                       <a:r>
                         <a:rPr lang="es-PE" dirty="0"/>
-                        <a:t>37.15%</a:t>
+                        <a:t>51.15%</a:t>
                       </a:r>
                     </a:p>
                   </a:txBody>
@@ -4399,7 +4409,7 @@
                       <a:pPr algn="ctr"/>
                       <a:r>
                         <a:rPr lang="es-PE" dirty="0"/>
-                        <a:t>55.36%</a:t>
+                        <a:t>51.68%</a:t>
                       </a:r>
                     </a:p>
                   </a:txBody>
@@ -4532,7 +4542,7 @@
                       <a:pPr algn="ctr"/>
                       <a:r>
                         <a:rPr lang="es-PE" dirty="0"/>
-                        <a:t>35.17%</a:t>
+                        <a:t>54.27%</a:t>
                       </a:r>
                     </a:p>
                   </a:txBody>

</xml_diff>